<commit_message>
last version before presentation
</commit_message>
<xml_diff>
--- a/DOC/presentationLogicEmulator.pptx
+++ b/DOC/presentationLogicEmulator.pptx
@@ -6,7 +6,7 @@
     <p:sldMasterId id="2147483649" r:id="rId2"/>
   </p:sldMasterIdLst>
   <p:notesMasterIdLst>
-    <p:notesMasterId r:id="rId14"/>
+    <p:notesMasterId r:id="rId15"/>
   </p:notesMasterIdLst>
   <p:sldIdLst>
     <p:sldId id="256" r:id="rId3"/>
@@ -18,8 +18,9 @@
     <p:sldId id="261" r:id="rId9"/>
     <p:sldId id="262" r:id="rId10"/>
     <p:sldId id="264" r:id="rId11"/>
-    <p:sldId id="265" r:id="rId12"/>
-    <p:sldId id="266" r:id="rId13"/>
+    <p:sldId id="267" r:id="rId12"/>
+    <p:sldId id="265" r:id="rId13"/>
+    <p:sldId id="266" r:id="rId14"/>
   </p:sldIdLst>
   <p:sldSz cx="9906000" cy="6858000" type="A4"/>
   <p:notesSz cx="6858000" cy="9144000"/>
@@ -148,6 +149,14 @@
       </a:defRPr>
     </a:lvl9pPr>
   </p:defaultTextStyle>
+  <p:extLst>
+    <p:ext uri="{EFAFB233-063F-42B5-8137-9DF3F51BA10A}">
+      <p15:sldGuideLst xmlns:p15="http://schemas.microsoft.com/office/powerpoint/2012/main"/>
+    </p:ext>
+    <p:ext uri="{2D200454-40CA-4A62-9FC3-DE9A4176ACB9}">
+      <p15:notesGuideLst xmlns:p15="http://schemas.microsoft.com/office/powerpoint/2012/main"/>
+    </p:ext>
+  </p:extLst>
 </p:presentation>
 </file>
 
@@ -744,7 +753,7 @@
             </a:extLst>
           </p:cNvPr>
           <p:cNvSpPr>
-            <a:spLocks noGrp="1" noChangeArrowheads="1"/>
+            <a:spLocks noGrp="1" noRot="1" noChangeAspect="1" noChangeArrowheads="1"/>
           </p:cNvSpPr>
           <p:nvPr>
             <p:ph type="sldImg"/>
@@ -3187,7 +3196,7 @@
             </a:extLst>
           </p:cNvPr>
           <p:cNvSpPr>
-            <a:spLocks noChangeArrowheads="1" noTextEdit="1"/>
+            <a:spLocks noGrp="1" noRot="1" noChangeAspect="1" noChangeArrowheads="1" noTextEdit="1"/>
           </p:cNvSpPr>
           <p:nvPr>
             <p:ph type="sldImg"/>
@@ -3232,7 +3241,7 @@
             </a:extLst>
           </p:cNvPr>
           <p:cNvSpPr>
-            <a:spLocks noChangeArrowheads="1"/>
+            <a:spLocks noGrp="1" noChangeArrowheads="1"/>
           </p:cNvSpPr>
           <p:nvPr>
             <p:ph type="body" idx="1"/>
@@ -5272,7 +5281,7 @@
             </a:extLst>
           </p:cNvPr>
           <p:cNvSpPr>
-            <a:spLocks noChangeArrowheads="1" noTextEdit="1"/>
+            <a:spLocks noGrp="1" noRot="1" noChangeAspect="1" noChangeArrowheads="1" noTextEdit="1"/>
           </p:cNvSpPr>
           <p:nvPr>
             <p:ph type="sldImg"/>
@@ -5317,7 +5326,7 @@
             </a:extLst>
           </p:cNvPr>
           <p:cNvSpPr>
-            <a:spLocks noChangeArrowheads="1"/>
+            <a:spLocks noGrp="1" noChangeArrowheads="1"/>
           </p:cNvSpPr>
           <p:nvPr>
             <p:ph type="body" idx="1"/>
@@ -11186,6 +11195,55 @@
           <a:chExt cx="0" cy="0"/>
         </a:xfrm>
       </p:grpSpPr>
+      <p:sp>
+        <p:nvSpPr>
+          <p:cNvPr id="3" name="ZoneTexte 2">
+            <a:extLst>
+              <a:ext uri="{FF2B5EF4-FFF2-40B4-BE49-F238E27FC236}">
+                <a16:creationId xmlns:a16="http://schemas.microsoft.com/office/drawing/2014/main" id="{CBD73AE5-BA9D-4876-AD34-1B47D1DB8270}"/>
+              </a:ext>
+            </a:extLst>
+          </p:cNvPr>
+          <p:cNvSpPr txBox="1"/>
+          <p:nvPr/>
+        </p:nvSpPr>
+        <p:spPr>
+          <a:xfrm>
+            <a:off x="632520" y="5301208"/>
+            <a:ext cx="4195379" cy="707886"/>
+          </a:xfrm>
+          <a:prstGeom prst="rect">
+            <a:avLst/>
+          </a:prstGeom>
+          <a:noFill/>
+        </p:spPr>
+        <p:txBody>
+          <a:bodyPr wrap="none" rtlCol="0">
+            <a:spAutoFit/>
+          </a:bodyPr>
+          <a:lstStyle/>
+          <a:p>
+            <a:r>
+              <a:rPr lang="fr-CH" dirty="0">
+                <a:solidFill>
+                  <a:schemeClr val="tx1"/>
+                </a:solidFill>
+              </a:rPr>
+              <a:t>Inf2 : projet C++ de fin de semestre</a:t>
+            </a:r>
+          </a:p>
+          <a:p>
+            <a:r>
+              <a:rPr lang="fr-CH" dirty="0">
+                <a:solidFill>
+                  <a:schemeClr val="tx1"/>
+                </a:solidFill>
+              </a:rPr>
+              <a:t>Gilles Mottiez I4</a:t>
+            </a:r>
+          </a:p>
+        </p:txBody>
+      </p:sp>
     </p:spTree>
   </p:cSld>
   <p:clrMapOvr>
@@ -11196,6 +11254,168 @@
 </file>
 
 <file path=ppt/slides/slide10.xml><?xml version="1.0" encoding="utf-8"?>
+<p:sld xmlns:a="http://schemas.openxmlformats.org/drawingml/2006/main" xmlns:r="http://schemas.openxmlformats.org/officeDocument/2006/relationships" xmlns:p="http://schemas.openxmlformats.org/presentationml/2006/main">
+  <p:cSld>
+    <p:spTree>
+      <p:nvGrpSpPr>
+        <p:cNvPr id="1" name=""/>
+        <p:cNvGrpSpPr/>
+        <p:nvPr/>
+      </p:nvGrpSpPr>
+      <p:grpSpPr>
+        <a:xfrm>
+          <a:off x="0" y="0"/>
+          <a:ext cx="0" cy="0"/>
+          <a:chOff x="0" y="0"/>
+          <a:chExt cx="0" cy="0"/>
+        </a:xfrm>
+      </p:grpSpPr>
+      <p:sp>
+        <p:nvSpPr>
+          <p:cNvPr id="2" name="Titre 1">
+            <a:extLst>
+              <a:ext uri="{FF2B5EF4-FFF2-40B4-BE49-F238E27FC236}">
+                <a16:creationId xmlns:a16="http://schemas.microsoft.com/office/drawing/2014/main" id="{E56BFAF1-4C76-4586-A208-F6C1B3119FAA}"/>
+              </a:ext>
+            </a:extLst>
+          </p:cNvPr>
+          <p:cNvSpPr>
+            <a:spLocks noGrp="1"/>
+          </p:cNvSpPr>
+          <p:nvPr>
+            <p:ph type="title"/>
+          </p:nvPr>
+        </p:nvSpPr>
+        <p:spPr>
+          <a:xfrm>
+            <a:off x="495301" y="274638"/>
+            <a:ext cx="5393804" cy="1141412"/>
+          </a:xfrm>
+        </p:spPr>
+        <p:txBody>
+          <a:bodyPr/>
+          <a:lstStyle/>
+          <a:p>
+            <a:r>
+              <a:rPr lang="fr-CH" dirty="0"/>
+              <a:t>Améliorations </a:t>
+            </a:r>
+          </a:p>
+        </p:txBody>
+      </p:sp>
+      <p:sp>
+        <p:nvSpPr>
+          <p:cNvPr id="3" name="Espace réservé du contenu 2">
+            <a:extLst>
+              <a:ext uri="{FF2B5EF4-FFF2-40B4-BE49-F238E27FC236}">
+                <a16:creationId xmlns:a16="http://schemas.microsoft.com/office/drawing/2014/main" id="{32267F2E-00EF-411B-907C-E4C4045D1D8C}"/>
+              </a:ext>
+            </a:extLst>
+          </p:cNvPr>
+          <p:cNvSpPr>
+            <a:spLocks noGrp="1"/>
+          </p:cNvSpPr>
+          <p:nvPr>
+            <p:ph idx="1"/>
+          </p:nvPr>
+        </p:nvSpPr>
+        <p:spPr/>
+        <p:txBody>
+          <a:bodyPr/>
+          <a:lstStyle/>
+          <a:p>
+            <a:pPr marL="457200" indent="-457200">
+              <a:buFont typeface="Arial" panose="020B0604020202020204" pitchFamily="34" charset="0"/>
+              <a:buChar char="•"/>
+            </a:pPr>
+            <a:r>
+              <a:rPr lang="fr-CH" dirty="0"/>
+              <a:t>V0.0</a:t>
+            </a:r>
+          </a:p>
+          <a:p>
+            <a:pPr marL="857250" lvl="1" indent="-457200">
+              <a:buFont typeface="Arial" panose="020B0604020202020204" pitchFamily="34" charset="0"/>
+              <a:buChar char="•"/>
+            </a:pPr>
+            <a:r>
+              <a:rPr lang="fr-CH" dirty="0"/>
+              <a:t>Graphisme : portes à n entrées</a:t>
+            </a:r>
+          </a:p>
+          <a:p>
+            <a:pPr marL="857250" lvl="1" indent="-457200">
+              <a:buFont typeface="Arial" panose="020B0604020202020204" pitchFamily="34" charset="0"/>
+              <a:buChar char="•"/>
+            </a:pPr>
+            <a:r>
+              <a:rPr lang="fr-CH" dirty="0"/>
+              <a:t>Zoom automatique des portes</a:t>
+            </a:r>
+          </a:p>
+          <a:p>
+            <a:pPr marL="457200" indent="-457200">
+              <a:buFont typeface="Arial" panose="020B0604020202020204" pitchFamily="34" charset="0"/>
+              <a:buChar char="•"/>
+            </a:pPr>
+            <a:r>
+              <a:rPr lang="fr-CH" dirty="0"/>
+              <a:t>V1.0</a:t>
+            </a:r>
+          </a:p>
+          <a:p>
+            <a:pPr marL="857250" lvl="1" indent="-457200">
+              <a:buFont typeface="Arial" panose="020B0604020202020204" pitchFamily="34" charset="0"/>
+              <a:buChar char="•"/>
+            </a:pPr>
+            <a:r>
+              <a:rPr lang="fr-CH" dirty="0"/>
+              <a:t>Blocs logiques NAND, NOR, XOR…</a:t>
+            </a:r>
+          </a:p>
+          <a:p>
+            <a:pPr marL="457200" indent="-457200">
+              <a:buFont typeface="Arial" panose="020B0604020202020204" pitchFamily="34" charset="0"/>
+              <a:buChar char="•"/>
+            </a:pPr>
+            <a:r>
+              <a:rPr lang="fr-CH" dirty="0"/>
+              <a:t>V2.0</a:t>
+            </a:r>
+          </a:p>
+          <a:p>
+            <a:pPr marL="857250" lvl="1" indent="-457200">
+              <a:buFont typeface="Arial" panose="020B0604020202020204" pitchFamily="34" charset="0"/>
+              <a:buChar char="•"/>
+            </a:pPr>
+            <a:r>
+              <a:rPr lang="fr-CH" dirty="0"/>
+              <a:t>Bascules temporelles</a:t>
+            </a:r>
+          </a:p>
+          <a:p>
+            <a:pPr marL="857250" lvl="1" indent="-457200">
+              <a:buFont typeface="Arial" panose="020B0604020202020204" pitchFamily="34" charset="0"/>
+              <a:buChar char="•"/>
+            </a:pPr>
+            <a:endParaRPr lang="fr-CH" dirty="0"/>
+          </a:p>
+        </p:txBody>
+      </p:sp>
+    </p:spTree>
+    <p:extLst>
+      <p:ext uri="{BB962C8B-B14F-4D97-AF65-F5344CB8AC3E}">
+        <p14:creationId xmlns:p14="http://schemas.microsoft.com/office/powerpoint/2010/main" val="4186519654"/>
+      </p:ext>
+    </p:extLst>
+  </p:cSld>
+  <p:clrMapOvr>
+    <a:masterClrMapping/>
+  </p:clrMapOvr>
+</p:sld>
+</file>
+
+<file path=ppt/slides/slide11.xml><?xml version="1.0" encoding="utf-8"?>
 <p:sld xmlns:a="http://schemas.openxmlformats.org/drawingml/2006/main" xmlns:r="http://schemas.openxmlformats.org/officeDocument/2006/relationships" xmlns:p="http://schemas.openxmlformats.org/presentationml/2006/main">
   <p:cSld>
     <p:spTree>
@@ -11258,7 +11478,7 @@
 </p:sld>
 </file>
 
-<file path=ppt/slides/slide11.xml><?xml version="1.0" encoding="utf-8"?>
+<file path=ppt/slides/slide12.xml><?xml version="1.0" encoding="utf-8"?>
 <p:sld xmlns:a="http://schemas.openxmlformats.org/drawingml/2006/main" xmlns:r="http://schemas.openxmlformats.org/officeDocument/2006/relationships" xmlns:p="http://schemas.openxmlformats.org/presentationml/2006/main">
   <p:cSld>
     <p:spTree>
@@ -12238,7 +12458,7 @@
                   <a:srgbClr val="000000"/>
                 </a:solidFill>
               </a:rPr>
-              <a:t>Une histoire de pointeurs ! </a:t>
+              <a:t>Logique : Une histoire de pointeurs ! </a:t>
             </a:r>
           </a:p>
           <a:p>
@@ -12432,7 +12652,7 @@
   <p:timing>
     <p:tnLst>
       <p:par>
-        <p:cTn id="1" dur="indefinite" nodeType="tmRoot">
+        <p:cTn id="1" dur="indefinite" restart="never" nodeType="tmRoot">
           <p:childTnLst>
             <p:seq concurrent="1" nextAc="seek">
               <p:cTn id="2" dur="0" nodeType="mainSeq"/>
@@ -12628,28 +12848,42 @@
             </a:pPr>
             <a:r>
               <a:rPr lang="fr-CH" dirty="0"/>
-              <a:t>Blocs </a:t>
-            </a:r>
-            <a:r>
-              <a:rPr lang="fr-CH" dirty="0" err="1"/>
-              <a:t>Nand</a:t>
-            </a:r>
+              <a:t>Composition de portes</a:t>
+            </a:r>
+          </a:p>
+          <a:p>
+            <a:pPr marL="0" indent="0"/>
+            <a:endParaRPr lang="fr-CH" dirty="0"/>
+          </a:p>
+          <a:p>
+            <a:pPr marL="457200" indent="-457200">
+              <a:buFont typeface="Arial" panose="020B0604020202020204" pitchFamily="34" charset="0"/>
+              <a:buChar char="•"/>
+            </a:pPr>
             <a:r>
               <a:rPr lang="fr-CH" dirty="0"/>
-              <a:t>, </a:t>
-            </a:r>
-            <a:r>
-              <a:rPr lang="fr-CH" dirty="0" err="1"/>
-              <a:t>Nor</a:t>
-            </a:r>
+              <a:t>V2.0</a:t>
+            </a:r>
+          </a:p>
+          <a:p>
+            <a:pPr marL="857250" lvl="1" indent="-457200">
+              <a:buFont typeface="Arial" panose="020B0604020202020204" pitchFamily="34" charset="0"/>
+              <a:buChar char="•"/>
+            </a:pPr>
             <a:r>
               <a:rPr lang="fr-CH" dirty="0"/>
-              <a:t>, </a:t>
-            </a:r>
-            <a:r>
-              <a:rPr lang="fr-CH" dirty="0" err="1"/>
-              <a:t>Xor</a:t>
-            </a:r>
+              <a:t>Bascules temporelles</a:t>
+            </a:r>
+          </a:p>
+          <a:p>
+            <a:pPr marL="857250" lvl="1" indent="-457200">
+              <a:buFont typeface="Arial" panose="020B0604020202020204" pitchFamily="34" charset="0"/>
+              <a:buChar char="•"/>
+            </a:pPr>
+            <a:endParaRPr lang="fr-CH" dirty="0"/>
+          </a:p>
+          <a:p>
+            <a:pPr marL="400050" lvl="1" indent="0"/>
             <a:endParaRPr lang="fr-CH" dirty="0"/>
           </a:p>
         </p:txBody>
@@ -12829,8 +13063,8 @@
         </p:nvSpPr>
         <p:spPr>
           <a:xfrm>
-            <a:off x="495301" y="274638"/>
-            <a:ext cx="5537820" cy="1141412"/>
+            <a:off x="495300" y="274638"/>
+            <a:ext cx="5609827" cy="1141412"/>
           </a:xfrm>
         </p:spPr>
         <p:txBody>
@@ -12838,14 +13072,9 @@
           <a:lstStyle/>
           <a:p>
             <a:r>
-              <a:rPr lang="fr-CH" sz="3200" dirty="0"/>
-              <a:t>Conversion Json -&gt; objets </a:t>
-            </a:r>
-            <a:r>
-              <a:rPr lang="fr-CH" sz="3200" dirty="0" err="1"/>
-              <a:t>c++</a:t>
-            </a:r>
-            <a:endParaRPr lang="fr-CH" sz="3200" dirty="0"/>
+              <a:rPr lang="fr-CH" sz="2800" dirty="0"/>
+              <a:t>Conversion Json -&gt; objets C++</a:t>
+            </a:r>
           </a:p>
         </p:txBody>
       </p:sp>
@@ -12938,7 +13167,7 @@
         </p:blipFill>
         <p:spPr>
           <a:xfrm>
-            <a:off x="2504728" y="2066926"/>
+            <a:off x="2720752" y="2002113"/>
             <a:ext cx="6904385" cy="4126742"/>
           </a:xfrm>
         </p:spPr>
@@ -12989,7 +13218,12 @@
             <p:ph type="title"/>
           </p:nvPr>
         </p:nvSpPr>
-        <p:spPr/>
+        <p:spPr>
+          <a:xfrm>
+            <a:off x="495301" y="274638"/>
+            <a:ext cx="5825852" cy="1141412"/>
+          </a:xfrm>
+        </p:spPr>
         <p:txBody>
           <a:bodyPr/>
           <a:lstStyle/>
@@ -13117,8 +13351,12 @@
               <a:buChar char="•"/>
             </a:pPr>
             <a:r>
+              <a:rPr lang="fr-CH" dirty="0" err="1"/>
+              <a:t>Bool</a:t>
+            </a:r>
+            <a:r>
               <a:rPr lang="fr-CH" dirty="0"/>
-              <a:t>State : high, </a:t>
+              <a:t> state : high, </a:t>
             </a:r>
             <a:r>
               <a:rPr lang="fr-CH" dirty="0" err="1"/>
@@ -13498,10 +13736,10 @@
       </p:sp>
       <p:pic>
         <p:nvPicPr>
-          <p:cNvPr id="7" name="Espace réservé du contenu 6">
+          <p:cNvPr id="8" name="Espace réservé du contenu 7">
             <a:extLst>
               <a:ext uri="{FF2B5EF4-FFF2-40B4-BE49-F238E27FC236}">
-                <a16:creationId xmlns:a16="http://schemas.microsoft.com/office/drawing/2014/main" id="{C31B9AC0-90A8-420D-9EB7-5943B0101ACF}"/>
+                <a16:creationId xmlns:a16="http://schemas.microsoft.com/office/drawing/2014/main" id="{E1A4C90B-864C-476A-B777-483B5CAEC1A3}"/>
               </a:ext>
             </a:extLst>
           </p:cNvPr>
@@ -13520,8 +13758,8 @@
         </p:blipFill>
         <p:spPr>
           <a:xfrm>
-            <a:off x="3851047" y="2780928"/>
-            <a:ext cx="5787732" cy="2592288"/>
+            <a:off x="3800872" y="2708920"/>
+            <a:ext cx="5417170" cy="2534639"/>
           </a:xfrm>
           <a:prstGeom prst="rect">
             <a:avLst/>

</xml_diff>